<commit_message>
chore: update verso-3a.pptx template file
</commit_message>
<xml_diff>
--- a/public/templates/verso-3a.pptx
+++ b/public/templates/verso-3a.pptx
@@ -3082,7 +3082,7 @@
         <p:spPr>
           <a:xfrm>
             <a:off x="6878160" y="1698480"/>
-            <a:ext cx="2230200" cy="998820"/>
+            <a:ext cx="2346840" cy="983431"/>
           </a:xfrm>
           <a:prstGeom prst="rect">
             <a:avLst/>
@@ -3108,7 +3108,7 @@
           <a:fontRef idx="minor"/>
         </p:style>
         <p:txBody>
-          <a:bodyPr lIns="90000" tIns="45000" rIns="90000" bIns="45000" anchor="t">
+          <a:bodyPr wrap="square" lIns="90000" tIns="45000" rIns="90000" bIns="45000" anchor="t">
             <a:spAutoFit/>
           </a:bodyPr>
           <a:lstStyle/>
@@ -3130,34 +3130,6 @@
             <a:endParaRPr lang="en-US" sz="700" b="0" u="none" strike="noStrike" dirty="0">
               <a:solidFill>
                 <a:schemeClr val="dk1"/>
-              </a:solidFill>
-              <a:uFillTx/>
-              <a:latin typeface="Arial"/>
-            </a:endParaRPr>
-          </a:p>
-          <a:p>
-            <a:pPr algn="ctr" defTabSz="914400">
-              <a:lnSpc>
-                <a:spcPct val="100000"/>
-              </a:lnSpc>
-            </a:pPr>
-            <a:endParaRPr lang="en-US" sz="700" b="0" u="none" strike="noStrike" dirty="0">
-              <a:solidFill>
-                <a:srgbClr val="000000"/>
-              </a:solidFill>
-              <a:uFillTx/>
-              <a:latin typeface="Arial"/>
-            </a:endParaRPr>
-          </a:p>
-          <a:p>
-            <a:pPr algn="ctr" defTabSz="914400">
-              <a:lnSpc>
-                <a:spcPct val="100000"/>
-              </a:lnSpc>
-            </a:pPr>
-            <a:endParaRPr lang="en-US" sz="700" b="0" u="none" strike="noStrike" dirty="0">
-              <a:solidFill>
-                <a:srgbClr val="000000"/>
               </a:solidFill>
               <a:uFillTx/>
               <a:latin typeface="Arial"/>
@@ -3252,7 +3224,7 @@
               </a:lnSpc>
             </a:pPr>
             <a:r>
-              <a:rPr lang="pt-BR" sz="800" b="0" u="none" strike="noStrike" dirty="0">
+              <a:rPr lang="pt-BR" sz="700" b="0" u="none" strike="noStrike" dirty="0">
                 <a:solidFill>
                   <a:srgbClr val="000000"/>
                 </a:solidFill>
@@ -3262,7 +3234,7 @@
               <a:t>[</a:t>
             </a:r>
             <a:r>
-              <a:rPr lang="pt-BR" sz="800" dirty="0">
+              <a:rPr lang="pt-BR" sz="700" dirty="0">
                 <a:solidFill>
                   <a:srgbClr val="000000"/>
                 </a:solidFill>
@@ -3270,7 +3242,7 @@
               </a:rPr>
               <a:t>qualificacao_profissional1]</a:t>
             </a:r>
-            <a:endParaRPr lang="pt-BR" sz="800" b="0" u="none" strike="noStrike" dirty="0">
+            <a:endParaRPr lang="pt-BR" sz="700" b="0" u="none" strike="noStrike" dirty="0">
               <a:solidFill>
                 <a:srgbClr val="000000"/>
               </a:solidFill>
@@ -3286,7 +3258,7 @@
               </a:lnSpc>
             </a:pPr>
             <a:r>
-              <a:rPr lang="pt-BR" sz="800" b="0" u="none" strike="noStrike" dirty="0">
+              <a:rPr lang="pt-BR" sz="700" b="0" u="none" strike="noStrike" dirty="0">
                 <a:solidFill>
                   <a:srgbClr val="000000"/>
                 </a:solidFill>
@@ -3296,7 +3268,7 @@
               <a:t> [</a:t>
             </a:r>
             <a:r>
-              <a:rPr lang="pt-BR" sz="800" dirty="0">
+              <a:rPr lang="pt-BR" sz="700" dirty="0">
                 <a:solidFill>
                   <a:srgbClr val="000000"/>
                 </a:solidFill>
@@ -3305,7 +3277,7 @@
               <a:t>registro</a:t>
             </a:r>
             <a:r>
-              <a:rPr lang="pt-BR" sz="800" b="0" u="none" strike="noStrike" dirty="0">
+              <a:rPr lang="pt-BR" sz="700" b="0" u="none" strike="noStrike" dirty="0">
                 <a:solidFill>
                   <a:srgbClr val="000000"/>
                 </a:solidFill>
@@ -3315,7 +3287,7 @@
               <a:t>_</a:t>
             </a:r>
             <a:r>
-              <a:rPr lang="pt-BR" sz="800" dirty="0">
+              <a:rPr lang="pt-BR" sz="700" dirty="0">
                 <a:solidFill>
                   <a:srgbClr val="000000"/>
                 </a:solidFill>
@@ -3324,7 +3296,7 @@
               <a:t>qualificacao1</a:t>
             </a:r>
             <a:r>
-              <a:rPr lang="pt-BR" sz="800" b="0" u="none" strike="noStrike" dirty="0">
+              <a:rPr lang="pt-BR" sz="700" b="0" u="none" strike="noStrike" dirty="0">
                 <a:solidFill>
                   <a:srgbClr val="000000"/>
                 </a:solidFill>
@@ -3333,13 +3305,41 @@
               </a:rPr>
               <a:t>]</a:t>
             </a:r>
-            <a:endParaRPr lang="en-US" sz="800" b="0" u="none" strike="noStrike" dirty="0">
+            <a:endParaRPr lang="en-US" sz="700" b="0" u="none" strike="noStrike" dirty="0">
               <a:solidFill>
                 <a:srgbClr val="000000"/>
               </a:solidFill>
               <a:uFillTx/>
               <a:latin typeface="Arial"/>
               <a:cs typeface="Arial"/>
+            </a:endParaRPr>
+          </a:p>
+          <a:p>
+            <a:pPr algn="ctr" defTabSz="914400">
+              <a:lnSpc>
+                <a:spcPct val="100000"/>
+              </a:lnSpc>
+            </a:pPr>
+            <a:endParaRPr lang="en-US" sz="700" b="0" u="none" strike="noStrike" dirty="0">
+              <a:solidFill>
+                <a:srgbClr val="000000"/>
+              </a:solidFill>
+              <a:uFillTx/>
+              <a:latin typeface="Arial"/>
+            </a:endParaRPr>
+          </a:p>
+          <a:p>
+            <a:pPr algn="ctr" defTabSz="914400">
+              <a:lnSpc>
+                <a:spcPct val="100000"/>
+              </a:lnSpc>
+            </a:pPr>
+            <a:endParaRPr lang="en-US" sz="700" b="0" u="none" strike="noStrike" dirty="0">
+              <a:solidFill>
+                <a:srgbClr val="000000"/>
+              </a:solidFill>
+              <a:uFillTx/>
+              <a:latin typeface="Arial"/>
             </a:endParaRPr>
           </a:p>
         </p:txBody>
@@ -3588,7 +3588,7 @@
                         </a:rPr>
                         <a:t>]</a:t>
                       </a:r>
-                      <a:endParaRPr lang="en-US" sz="1200" b="0" u="none" strike="noStrike">
+                      <a:endParaRPr lang="en-US" sz="1200" b="0" u="none" strike="noStrike" dirty="0">
                         <a:solidFill>
                           <a:srgbClr val="000000"/>
                         </a:solidFill>
@@ -3644,7 +3644,7 @@
         <p:spPr>
           <a:xfrm>
             <a:off x="6878160" y="2760480"/>
-            <a:ext cx="2230200" cy="998820"/>
+            <a:ext cx="2346840" cy="968042"/>
           </a:xfrm>
           <a:prstGeom prst="rect">
             <a:avLst/>
@@ -3670,7 +3670,7 @@
           <a:fontRef idx="minor"/>
         </p:style>
         <p:txBody>
-          <a:bodyPr lIns="90000" tIns="45000" rIns="90000" bIns="45000" anchor="t">
+          <a:bodyPr wrap="square" lIns="90000" tIns="45000" rIns="90000" bIns="45000" anchor="t">
             <a:spAutoFit/>
           </a:bodyPr>
           <a:lstStyle/>
@@ -3706,7 +3706,84 @@
             </a:endParaRPr>
           </a:p>
           <a:p>
-            <a:pPr defTabSz="914400">
+            <a:pPr algn="ctr"/>
+            <a:r>
+              <a:rPr lang="pt-BR" sz="700" dirty="0">
+                <a:solidFill>
+                  <a:schemeClr val="dk1"/>
+                </a:solidFill>
+                <a:latin typeface="Arial"/>
+              </a:rPr>
+              <a:t>_________________________________________</a:t>
+            </a:r>
+            <a:endParaRPr lang="en-US" sz="700" dirty="0">
+              <a:solidFill>
+                <a:schemeClr val="dk1"/>
+              </a:solidFill>
+              <a:latin typeface="Arial"/>
+            </a:endParaRPr>
+          </a:p>
+          <a:p>
+            <a:pPr algn="ctr"/>
+            <a:r>
+              <a:rPr lang="pt-BR" sz="800" b="1" dirty="0">
+                <a:solidFill>
+                  <a:schemeClr val="dk1"/>
+                </a:solidFill>
+                <a:latin typeface="Arial"/>
+                <a:ea typeface="Times New Roman"/>
+              </a:rPr>
+              <a:t>[nome2]</a:t>
+            </a:r>
+            <a:endParaRPr lang="en-US" sz="800" dirty="0">
+              <a:solidFill>
+                <a:schemeClr val="dk1"/>
+              </a:solidFill>
+              <a:latin typeface="Arial"/>
+              <a:cs typeface="Arial"/>
+            </a:endParaRPr>
+          </a:p>
+          <a:p>
+            <a:pPr algn="ctr"/>
+            <a:r>
+              <a:rPr lang="pt-BR" sz="700" dirty="0">
+                <a:solidFill>
+                  <a:schemeClr val="dk1"/>
+                </a:solidFill>
+                <a:latin typeface="Arial"/>
+                <a:ea typeface="Times New Roman"/>
+              </a:rPr>
+              <a:t>[qualificacao_profissional2]</a:t>
+            </a:r>
+            <a:endParaRPr lang="pt-BR" sz="700" dirty="0">
+              <a:solidFill>
+                <a:schemeClr val="dk1"/>
+              </a:solidFill>
+              <a:latin typeface="Arial"/>
+              <a:ea typeface="Times New Roman"/>
+              <a:cs typeface="Arial"/>
+            </a:endParaRPr>
+          </a:p>
+          <a:p>
+            <a:pPr algn="ctr"/>
+            <a:r>
+              <a:rPr lang="pt-BR" sz="700" dirty="0">
+                <a:solidFill>
+                  <a:schemeClr val="dk1"/>
+                </a:solidFill>
+                <a:latin typeface="Arial"/>
+                <a:ea typeface="Times New Roman"/>
+              </a:rPr>
+              <a:t>[registro_qualificacao2]</a:t>
+            </a:r>
+            <a:endParaRPr lang="en-US" sz="700" dirty="0">
+              <a:solidFill>
+                <a:schemeClr val="dk1"/>
+              </a:solidFill>
+            </a:endParaRPr>
+          </a:p>
+          <a:p>
+            <a:pPr algn="ctr" defTabSz="914400">
               <a:lnSpc>
                 <a:spcPct val="100000"/>
               </a:lnSpc>
@@ -3731,184 +3808,6 @@
               </a:solidFill>
               <a:uFillTx/>
               <a:latin typeface="Arial"/>
-            </a:endParaRPr>
-          </a:p>
-          <a:p>
-            <a:pPr algn="ctr" defTabSz="914400">
-              <a:lnSpc>
-                <a:spcPct val="100000"/>
-              </a:lnSpc>
-            </a:pPr>
-            <a:r>
-              <a:rPr lang="pt-BR" sz="700" b="0" u="none" strike="noStrike" dirty="0">
-                <a:solidFill>
-                  <a:schemeClr val="dk1"/>
-                </a:solidFill>
-                <a:uFillTx/>
-                <a:latin typeface="Arial"/>
-              </a:rPr>
-              <a:t>_________________________________________</a:t>
-            </a:r>
-            <a:endParaRPr lang="en-US" sz="700" b="0" u="none" strike="noStrike" dirty="0">
-              <a:solidFill>
-                <a:schemeClr val="dk1"/>
-              </a:solidFill>
-              <a:uFillTx/>
-              <a:latin typeface="Arial"/>
-            </a:endParaRPr>
-          </a:p>
-          <a:p>
-            <a:pPr algn="ctr" defTabSz="914400">
-              <a:lnSpc>
-                <a:spcPct val="100000"/>
-              </a:lnSpc>
-            </a:pPr>
-            <a:r>
-              <a:rPr lang="pt-BR" sz="800" b="1" u="none" strike="noStrike" dirty="0">
-                <a:solidFill>
-                  <a:schemeClr val="dk1"/>
-                </a:solidFill>
-                <a:uFillTx/>
-                <a:latin typeface="Arial"/>
-                <a:ea typeface="Times New Roman"/>
-              </a:rPr>
-              <a:t>[</a:t>
-            </a:r>
-            <a:r>
-              <a:rPr lang="pt-BR" sz="800" b="1" dirty="0">
-                <a:solidFill>
-                  <a:schemeClr val="dk1"/>
-                </a:solidFill>
-                <a:latin typeface="Arial"/>
-                <a:ea typeface="Times New Roman"/>
-              </a:rPr>
-              <a:t>nome2]</a:t>
-            </a:r>
-            <a:endParaRPr lang="en-US" sz="800" b="0" u="none" strike="noStrike" dirty="0">
-              <a:solidFill>
-                <a:schemeClr val="dk1"/>
-              </a:solidFill>
-              <a:uFillTx/>
-              <a:latin typeface="Arial"/>
-              <a:cs typeface="Arial"/>
-            </a:endParaRPr>
-          </a:p>
-          <a:p>
-            <a:pPr algn="ctr"/>
-            <a:r>
-              <a:rPr lang="pt-BR" sz="800" dirty="0">
-                <a:solidFill>
-                  <a:schemeClr val="dk1"/>
-                </a:solidFill>
-                <a:latin typeface="Arial"/>
-                <a:ea typeface="Times New Roman"/>
-              </a:rPr>
-              <a:t>[qualificacao</a:t>
-            </a:r>
-            <a:r>
-              <a:rPr lang="pt-BR" sz="800" b="0" u="none" strike="noStrike" dirty="0">
-                <a:solidFill>
-                  <a:schemeClr val="dk1"/>
-                </a:solidFill>
-                <a:uFillTx/>
-                <a:latin typeface="Arial"/>
-                <a:ea typeface="Times New Roman"/>
-              </a:rPr>
-              <a:t>_</a:t>
-            </a:r>
-            <a:r>
-              <a:rPr lang="pt-BR" sz="800" dirty="0">
-                <a:solidFill>
-                  <a:schemeClr val="dk1"/>
-                </a:solidFill>
-                <a:latin typeface="Arial"/>
-                <a:ea typeface="Times New Roman"/>
-              </a:rPr>
-              <a:t>profissional2</a:t>
-            </a:r>
-            <a:r>
-              <a:rPr lang="pt-BR" sz="800" b="0" u="none" strike="noStrike" dirty="0">
-                <a:solidFill>
-                  <a:schemeClr val="dk1"/>
-                </a:solidFill>
-                <a:uFillTx/>
-                <a:latin typeface="Arial"/>
-                <a:ea typeface="Times New Roman"/>
-              </a:rPr>
-              <a:t>]</a:t>
-            </a:r>
-            <a:endParaRPr lang="pt-BR" sz="800" dirty="0">
-              <a:solidFill>
-                <a:schemeClr val="dk1"/>
-              </a:solidFill>
-              <a:latin typeface="Arial"/>
-              <a:ea typeface="Times New Roman"/>
-              <a:cs typeface="Arial"/>
-            </a:endParaRPr>
-          </a:p>
-          <a:p>
-            <a:pPr algn="ctr" defTabSz="914400">
-              <a:lnSpc>
-                <a:spcPct val="100000"/>
-              </a:lnSpc>
-            </a:pPr>
-            <a:r>
-              <a:rPr lang="pt-BR" sz="800" b="0" u="none" strike="noStrike" dirty="0">
-                <a:solidFill>
-                  <a:schemeClr val="dk1"/>
-                </a:solidFill>
-                <a:uFillTx/>
-                <a:latin typeface="Arial"/>
-                <a:ea typeface="Times New Roman"/>
-              </a:rPr>
-              <a:t>[</a:t>
-            </a:r>
-            <a:r>
-              <a:rPr lang="pt-BR" sz="800" dirty="0">
-                <a:solidFill>
-                  <a:schemeClr val="dk1"/>
-                </a:solidFill>
-                <a:latin typeface="Arial"/>
-                <a:ea typeface="Times New Roman"/>
-              </a:rPr>
-              <a:t>registro</a:t>
-            </a:r>
-            <a:r>
-              <a:rPr lang="pt-BR" sz="800" b="0" u="none" strike="noStrike" dirty="0">
-                <a:solidFill>
-                  <a:schemeClr val="dk1"/>
-                </a:solidFill>
-                <a:uFillTx/>
-                <a:latin typeface="Arial"/>
-                <a:ea typeface="Times New Roman"/>
-              </a:rPr>
-              <a:t>_</a:t>
-            </a:r>
-            <a:r>
-              <a:rPr lang="pt-BR" sz="800" dirty="0">
-                <a:solidFill>
-                  <a:schemeClr val="dk1"/>
-                </a:solidFill>
-                <a:latin typeface="Arial"/>
-                <a:ea typeface="Times New Roman"/>
-              </a:rPr>
-              <a:t>qualificacao2</a:t>
-            </a:r>
-            <a:r>
-              <a:rPr lang="pt-BR" sz="800" b="0" u="none" strike="noStrike" dirty="0">
-                <a:solidFill>
-                  <a:schemeClr val="dk1"/>
-                </a:solidFill>
-                <a:uFillTx/>
-                <a:latin typeface="Arial"/>
-                <a:ea typeface="Times New Roman"/>
-              </a:rPr>
-              <a:t>]</a:t>
-            </a:r>
-            <a:endParaRPr lang="en-US" dirty="0">
-              <a:solidFill>
-                <a:schemeClr val="dk1"/>
-              </a:solidFill>
             </a:endParaRPr>
           </a:p>
         </p:txBody>
@@ -3928,7 +3827,7 @@
         <p:spPr>
           <a:xfrm>
             <a:off x="6878160" y="3822480"/>
-            <a:ext cx="2230200" cy="998820"/>
+            <a:ext cx="2346840" cy="968042"/>
           </a:xfrm>
           <a:prstGeom prst="rect">
             <a:avLst/>
@@ -3954,7 +3853,7 @@
           <a:fontRef idx="minor"/>
         </p:style>
         <p:txBody>
-          <a:bodyPr lIns="90000" tIns="45000" rIns="90000" bIns="45000" anchor="t">
+          <a:bodyPr wrap="square" lIns="90000" tIns="45000" rIns="90000" bIns="45000" anchor="t">
             <a:spAutoFit/>
           </a:bodyPr>
           <a:lstStyle/>
@@ -3974,34 +3873,6 @@
               <a:t>[assinatura_3]</a:t>
             </a:r>
             <a:endParaRPr lang="pt-BR" dirty="0"/>
-          </a:p>
-          <a:p>
-            <a:pPr defTabSz="914400">
-              <a:lnSpc>
-                <a:spcPct val="100000"/>
-              </a:lnSpc>
-            </a:pPr>
-            <a:endParaRPr lang="en-US" sz="700" b="0" u="none" strike="noStrike" dirty="0">
-              <a:solidFill>
-                <a:srgbClr val="000000"/>
-              </a:solidFill>
-              <a:uFillTx/>
-              <a:latin typeface="Arial"/>
-            </a:endParaRPr>
-          </a:p>
-          <a:p>
-            <a:pPr defTabSz="914400">
-              <a:lnSpc>
-                <a:spcPct val="100000"/>
-              </a:lnSpc>
-            </a:pPr>
-            <a:endParaRPr lang="en-US" sz="700" b="0" u="none" strike="noStrike" dirty="0">
-              <a:solidFill>
-                <a:srgbClr val="000000"/>
-              </a:solidFill>
-              <a:uFillTx/>
-              <a:latin typeface="Arial"/>
-            </a:endParaRPr>
           </a:p>
           <a:p>
             <a:pPr defTabSz="914400">
@@ -4080,7 +3951,7 @@
           <a:p>
             <a:pPr algn="ctr"/>
             <a:r>
-              <a:rPr lang="pt-BR" sz="800" dirty="0">
+              <a:rPr lang="pt-BR" sz="700" dirty="0">
                 <a:solidFill>
                   <a:schemeClr val="dk1"/>
                 </a:solidFill>
@@ -4090,7 +3961,7 @@
               <a:t>[qualificacao</a:t>
             </a:r>
             <a:r>
-              <a:rPr lang="pt-BR" sz="800" b="0" u="none" strike="noStrike" dirty="0">
+              <a:rPr lang="pt-BR" sz="700" b="0" u="none" strike="noStrike" dirty="0">
                 <a:solidFill>
                   <a:schemeClr val="dk1"/>
                 </a:solidFill>
@@ -4101,7 +3972,7 @@
               <a:t>_</a:t>
             </a:r>
             <a:r>
-              <a:rPr lang="pt-BR" sz="800" dirty="0">
+              <a:rPr lang="pt-BR" sz="700" dirty="0">
                 <a:solidFill>
                   <a:schemeClr val="dk1"/>
                 </a:solidFill>
@@ -4111,7 +3982,7 @@
               <a:t>profissional3</a:t>
             </a:r>
             <a:r>
-              <a:rPr lang="pt-BR" sz="800" b="0" u="none" strike="noStrike" dirty="0">
+              <a:rPr lang="pt-BR" sz="700" b="0" u="none" strike="noStrike" dirty="0">
                 <a:solidFill>
                   <a:schemeClr val="dk1"/>
                 </a:solidFill>
@@ -4121,7 +3992,7 @@
               </a:rPr>
               <a:t>]</a:t>
             </a:r>
-            <a:endParaRPr lang="pt-BR" sz="800" dirty="0">
+            <a:endParaRPr lang="pt-BR" sz="700" dirty="0">
               <a:solidFill>
                 <a:schemeClr val="dk1"/>
               </a:solidFill>
@@ -4137,7 +4008,7 @@
               </a:lnSpc>
             </a:pPr>
             <a:r>
-              <a:rPr lang="pt-BR" sz="800" b="0" u="none" strike="noStrike" dirty="0">
+              <a:rPr lang="pt-BR" sz="700" b="0" u="none" strike="noStrike" dirty="0">
                 <a:solidFill>
                   <a:schemeClr val="dk1"/>
                 </a:solidFill>
@@ -4148,7 +4019,7 @@
               <a:t>[</a:t>
             </a:r>
             <a:r>
-              <a:rPr lang="pt-BR" sz="800" dirty="0">
+              <a:rPr lang="pt-BR" sz="700" dirty="0">
                 <a:solidFill>
                   <a:schemeClr val="dk1"/>
                 </a:solidFill>
@@ -4158,7 +4029,7 @@
               <a:t>registro</a:t>
             </a:r>
             <a:r>
-              <a:rPr lang="pt-BR" sz="800" b="0" u="none" strike="noStrike" dirty="0">
+              <a:rPr lang="pt-BR" sz="700" b="0" u="none" strike="noStrike" dirty="0">
                 <a:solidFill>
                   <a:schemeClr val="dk1"/>
                 </a:solidFill>
@@ -4169,7 +4040,7 @@
               <a:t>_</a:t>
             </a:r>
             <a:r>
-              <a:rPr lang="pt-BR" sz="800" dirty="0">
+              <a:rPr lang="pt-BR" sz="700" dirty="0">
                 <a:solidFill>
                   <a:schemeClr val="dk1"/>
                 </a:solidFill>
@@ -4179,7 +4050,7 @@
               <a:t>qualificacao3</a:t>
             </a:r>
             <a:r>
-              <a:rPr lang="pt-BR" sz="800" b="0" u="none" strike="noStrike" dirty="0">
+              <a:rPr lang="pt-BR" sz="700" b="0" u="none" strike="noStrike" dirty="0">
                 <a:solidFill>
                   <a:schemeClr val="dk1"/>
                 </a:solidFill>
@@ -4189,10 +4060,38 @@
               </a:rPr>
               <a:t>]</a:t>
             </a:r>
-            <a:endParaRPr lang="en-US" dirty="0">
+            <a:endParaRPr lang="en-US" sz="700" dirty="0">
               <a:solidFill>
                 <a:schemeClr val="dk1"/>
               </a:solidFill>
+            </a:endParaRPr>
+          </a:p>
+          <a:p>
+            <a:pPr algn="ctr" defTabSz="914400">
+              <a:lnSpc>
+                <a:spcPct val="100000"/>
+              </a:lnSpc>
+            </a:pPr>
+            <a:endParaRPr lang="en-US" sz="700" b="0" u="none" strike="noStrike" dirty="0">
+              <a:solidFill>
+                <a:srgbClr val="000000"/>
+              </a:solidFill>
+              <a:uFillTx/>
+              <a:latin typeface="Arial"/>
+            </a:endParaRPr>
+          </a:p>
+          <a:p>
+            <a:pPr algn="ctr" defTabSz="914400">
+              <a:lnSpc>
+                <a:spcPct val="100000"/>
+              </a:lnSpc>
+            </a:pPr>
+            <a:endParaRPr lang="en-US" sz="700" b="0" u="none" strike="noStrike" dirty="0">
+              <a:solidFill>
+                <a:srgbClr val="000000"/>
+              </a:solidFill>
+              <a:uFillTx/>
+              <a:latin typeface="Arial"/>
             </a:endParaRPr>
           </a:p>
         </p:txBody>

</xml_diff>

<commit_message>
feat: update verso-3a.pptx template for improved presentation quality
</commit_message>
<xml_diff>
--- a/public/templates/verso-3a.pptx
+++ b/public/templates/verso-3a.pptx
@@ -3351,14 +3351,14 @@
           <p:nvPr>
             <p:extLst>
               <p:ext uri="{D42A27DB-BD31-4B8C-83A1-F6EECF244321}">
-                <p14:modId xmlns:p14="http://schemas.microsoft.com/office/powerpoint/2010/main" val="1366603734"/>
+                <p14:modId xmlns:p14="http://schemas.microsoft.com/office/powerpoint/2010/main" val="127595550"/>
               </p:ext>
             </p:extLst>
           </p:nvPr>
         </p:nvGraphicFramePr>
         <p:xfrm>
           <a:off x="315720" y="1707480"/>
-          <a:ext cx="6467400" cy="3813858"/>
+          <a:ext cx="6467400" cy="3842928"/>
         </p:xfrm>
         <a:graphic>
           <a:graphicData uri="http://schemas.openxmlformats.org/drawingml/2006/table">
@@ -3373,7 +3373,7 @@
                   </a:extLst>
                 </a:gridCol>
               </a:tblGrid>
-              <a:tr h="326520">
+              <a:tr h="329009">
                 <a:tc>
                   <a:txBody>
                     <a:bodyPr/>
@@ -3547,7 +3547,7 @@
                   </a:ext>
                 </a:extLst>
               </a:tr>
-              <a:tr h="3487338">
+              <a:tr h="3513919">
                 <a:tc>
                   <a:txBody>
                     <a:bodyPr/>
@@ -3558,36 +3558,6 @@
                           <a:spcPct val="100000"/>
                         </a:lnSpc>
                       </a:pPr>
-                      <a:r>
-                        <a:rPr lang="pt-BR" sz="1000" b="0" u="none" strike="noStrike" dirty="0">
-                          <a:solidFill>
-                            <a:srgbClr val="000000"/>
-                          </a:solidFill>
-                          <a:uFillTx/>
-                          <a:latin typeface="Arial"/>
-                        </a:rPr>
-                        <a:t>[</a:t>
-                      </a:r>
-                      <a:r>
-                        <a:rPr lang="pt-BR" sz="1000" b="0" i="0" u="none" strike="noStrike" noProof="0" dirty="0" err="1">
-                          <a:solidFill>
-                            <a:srgbClr val="000000"/>
-                          </a:solidFill>
-                          <a:uFillTx/>
-                          <a:latin typeface="Arial"/>
-                        </a:rPr>
-                        <a:t>conteudo</a:t>
-                      </a:r>
-                      <a:r>
-                        <a:rPr lang="pt-BR" sz="1000" b="0" u="none" strike="noStrike" dirty="0">
-                          <a:solidFill>
-                            <a:srgbClr val="000000"/>
-                          </a:solidFill>
-                          <a:uFillTx/>
-                          <a:latin typeface="Arial"/>
-                        </a:rPr>
-                        <a:t>]</a:t>
-                      </a:r>
                       <a:endParaRPr lang="en-US" sz="1000" b="0" u="none" strike="noStrike" dirty="0">
                         <a:solidFill>
                           <a:srgbClr val="000000"/>
@@ -4093,6 +4063,49 @@
               <a:uFillTx/>
               <a:latin typeface="Arial"/>
             </a:endParaRPr>
+          </a:p>
+        </p:txBody>
+      </p:sp>
+      <p:sp>
+        <p:nvSpPr>
+          <p:cNvPr id="3" name="CaixaDeTexto 2">
+            <a:extLst>
+              <a:ext uri="{FF2B5EF4-FFF2-40B4-BE49-F238E27FC236}">
+                <a16:creationId xmlns:a16="http://schemas.microsoft.com/office/drawing/2014/main" id="{A054FECB-4D26-BF1B-960A-12D16A2E4632}"/>
+              </a:ext>
+            </a:extLst>
+          </p:cNvPr>
+          <p:cNvSpPr txBox="1"/>
+          <p:nvPr/>
+        </p:nvSpPr>
+        <p:spPr>
+          <a:xfrm>
+            <a:off x="315720" y="2029968"/>
+            <a:ext cx="6467400" cy="246221"/>
+          </a:xfrm>
+          <a:prstGeom prst="rect">
+            <a:avLst/>
+          </a:prstGeom>
+          <a:noFill/>
+        </p:spPr>
+        <p:txBody>
+          <a:bodyPr wrap="square" numCol="2" rtlCol="0">
+            <a:spAutoFit/>
+          </a:bodyPr>
+          <a:lstStyle/>
+          <a:p>
+            <a:r>
+              <a:rPr lang="pt-BR" sz="1000" dirty="0"/>
+              <a:t>[</a:t>
+            </a:r>
+            <a:r>
+              <a:rPr lang="pt-BR" sz="1000" dirty="0" err="1"/>
+              <a:t>conteudo</a:t>
+            </a:r>
+            <a:r>
+              <a:rPr lang="pt-BR" sz="1000" dirty="0"/>
+              <a:t>]</a:t>
+            </a:r>
           </a:p>
         </p:txBody>
       </p:sp>

</xml_diff>